<commit_message>
Summary of FFT works
800rpm and 400rpm data are analyzed. In 800 rpm data the 2Nm disturbance can be seen more clearly with respect to 600rpm as expected. 400 rpm under load data also analyzed. If the load is changed (both noload to pulse loading or under  changable loads), the speed of the machine creates error. This error can be seen from phase currents on neighbourhood of the fundamental freq in freq domain. Outcomes are in ppt file. How can I detect (freq, amp?) and characterize (periodic, non periodic, random, in a sequence?) these disturbances without FFT, with tricky algorithms (using filtering or scanner algorithms)? next issue is this.
</commit_message>
<xml_diff>
--- a/Parameter Estimation Works/SerhatServoAutoTune_RuzgemSetup/MATLAB_Disturbance_analysis_RuzgemData/FFT analysis - outcomes.pptx
+++ b/Parameter Estimation Works/SerhatServoAutoTune_RuzgemSetup/MATLAB_Disturbance_analysis_RuzgemData/FFT analysis - outcomes.pptx
@@ -11,9 +11,9 @@
     <p:sldId id="261" r:id="rId5"/>
     <p:sldId id="262" r:id="rId6"/>
     <p:sldId id="269" r:id="rId7"/>
-    <p:sldId id="270" r:id="rId8"/>
-    <p:sldId id="259" r:id="rId9"/>
-    <p:sldId id="271" r:id="rId10"/>
+    <p:sldId id="259" r:id="rId8"/>
+    <p:sldId id="271" r:id="rId9"/>
+    <p:sldId id="280" r:id="rId10"/>
     <p:sldId id="264" r:id="rId11"/>
     <p:sldId id="268" r:id="rId12"/>
     <p:sldId id="263" r:id="rId13"/>
@@ -26,8 +26,16 @@
     <p:sldId id="276" r:id="rId20"/>
     <p:sldId id="279" r:id="rId21"/>
     <p:sldId id="278" r:id="rId22"/>
-    <p:sldId id="280" r:id="rId23"/>
-    <p:sldId id="281" r:id="rId24"/>
+    <p:sldId id="282" r:id="rId23"/>
+    <p:sldId id="283" r:id="rId24"/>
+    <p:sldId id="284" r:id="rId25"/>
+    <p:sldId id="285" r:id="rId26"/>
+    <p:sldId id="286" r:id="rId27"/>
+    <p:sldId id="287" r:id="rId28"/>
+    <p:sldId id="289" r:id="rId29"/>
+    <p:sldId id="290" r:id="rId30"/>
+    <p:sldId id="288" r:id="rId31"/>
+    <p:sldId id="291" r:id="rId32"/>
   </p:sldIdLst>
   <p:sldSz cx="9144000" cy="6858000" type="screen4x3"/>
   <p:notesSz cx="6858000" cy="9144000"/>
@@ -311,7 +319,7 @@
             <a:fld id="{D9F75050-0E15-4C5B-92B0-66D068882F1F}" type="datetimeFigureOut">
               <a:rPr lang="tr-TR" smtClean="0"/>
               <a:pPr/>
-              <a:t>29.04.2020</a:t>
+              <a:t>04.05.2020</a:t>
             </a:fld>
             <a:endParaRPr lang="tr-TR"/>
           </a:p>
@@ -478,7 +486,7 @@
             <a:fld id="{D9F75050-0E15-4C5B-92B0-66D068882F1F}" type="datetimeFigureOut">
               <a:rPr lang="tr-TR" smtClean="0"/>
               <a:pPr/>
-              <a:t>29.04.2020</a:t>
+              <a:t>04.05.2020</a:t>
             </a:fld>
             <a:endParaRPr lang="tr-TR"/>
           </a:p>
@@ -655,7 +663,7 @@
             <a:fld id="{D9F75050-0E15-4C5B-92B0-66D068882F1F}" type="datetimeFigureOut">
               <a:rPr lang="tr-TR" smtClean="0"/>
               <a:pPr/>
-              <a:t>29.04.2020</a:t>
+              <a:t>04.05.2020</a:t>
             </a:fld>
             <a:endParaRPr lang="tr-TR"/>
           </a:p>
@@ -822,7 +830,7 @@
             <a:fld id="{D9F75050-0E15-4C5B-92B0-66D068882F1F}" type="datetimeFigureOut">
               <a:rPr lang="tr-TR" smtClean="0"/>
               <a:pPr/>
-              <a:t>29.04.2020</a:t>
+              <a:t>04.05.2020</a:t>
             </a:fld>
             <a:endParaRPr lang="tr-TR"/>
           </a:p>
@@ -1065,7 +1073,7 @@
             <a:fld id="{D9F75050-0E15-4C5B-92B0-66D068882F1F}" type="datetimeFigureOut">
               <a:rPr lang="tr-TR" smtClean="0"/>
               <a:pPr/>
-              <a:t>29.04.2020</a:t>
+              <a:t>04.05.2020</a:t>
             </a:fld>
             <a:endParaRPr lang="tr-TR"/>
           </a:p>
@@ -1350,7 +1358,7 @@
             <a:fld id="{D9F75050-0E15-4C5B-92B0-66D068882F1F}" type="datetimeFigureOut">
               <a:rPr lang="tr-TR" smtClean="0"/>
               <a:pPr/>
-              <a:t>29.04.2020</a:t>
+              <a:t>04.05.2020</a:t>
             </a:fld>
             <a:endParaRPr lang="tr-TR"/>
           </a:p>
@@ -1769,7 +1777,7 @@
             <a:fld id="{D9F75050-0E15-4C5B-92B0-66D068882F1F}" type="datetimeFigureOut">
               <a:rPr lang="tr-TR" smtClean="0"/>
               <a:pPr/>
-              <a:t>29.04.2020</a:t>
+              <a:t>04.05.2020</a:t>
             </a:fld>
             <a:endParaRPr lang="tr-TR"/>
           </a:p>
@@ -1884,7 +1892,7 @@
             <a:fld id="{D9F75050-0E15-4C5B-92B0-66D068882F1F}" type="datetimeFigureOut">
               <a:rPr lang="tr-TR" smtClean="0"/>
               <a:pPr/>
-              <a:t>29.04.2020</a:t>
+              <a:t>04.05.2020</a:t>
             </a:fld>
             <a:endParaRPr lang="tr-TR"/>
           </a:p>
@@ -1976,7 +1984,7 @@
             <a:fld id="{D9F75050-0E15-4C5B-92B0-66D068882F1F}" type="datetimeFigureOut">
               <a:rPr lang="tr-TR" smtClean="0"/>
               <a:pPr/>
-              <a:t>29.04.2020</a:t>
+              <a:t>04.05.2020</a:t>
             </a:fld>
             <a:endParaRPr lang="tr-TR"/>
           </a:p>
@@ -2250,7 +2258,7 @@
             <a:fld id="{D9F75050-0E15-4C5B-92B0-66D068882F1F}" type="datetimeFigureOut">
               <a:rPr lang="tr-TR" smtClean="0"/>
               <a:pPr/>
-              <a:t>29.04.2020</a:t>
+              <a:t>04.05.2020</a:t>
             </a:fld>
             <a:endParaRPr lang="tr-TR"/>
           </a:p>
@@ -2500,7 +2508,7 @@
             <a:fld id="{D9F75050-0E15-4C5B-92B0-66D068882F1F}" type="datetimeFigureOut">
               <a:rPr lang="tr-TR" smtClean="0"/>
               <a:pPr/>
-              <a:t>29.04.2020</a:t>
+              <a:t>04.05.2020</a:t>
             </a:fld>
             <a:endParaRPr lang="tr-TR"/>
           </a:p>
@@ -2710,7 +2718,7 @@
             <a:fld id="{D9F75050-0E15-4C5B-92B0-66D068882F1F}" type="datetimeFigureOut">
               <a:rPr lang="tr-TR" smtClean="0"/>
               <a:pPr/>
-              <a:t>29.04.2020</a:t>
+              <a:t>04.05.2020</a:t>
             </a:fld>
             <a:endParaRPr lang="tr-TR"/>
           </a:p>
@@ -4225,11 +4233,7 @@
             </a:r>
             <a:r>
               <a:rPr lang="tr-TR" dirty="0" smtClean="0"/>
-              <a:t> + </a:t>
-            </a:r>
-            <a:r>
-              <a:rPr lang="tr-TR" dirty="0" smtClean="0"/>
-              <a:t>4 </a:t>
+              <a:t> + 4 </a:t>
             </a:r>
             <a:r>
               <a:rPr lang="tr-TR" dirty="0" err="1" smtClean="0"/>
@@ -4628,38 +4632,6 @@
           </a:ln>
         </p:spPr>
       </p:pic>
-      <p:pic>
-        <p:nvPicPr>
-          <p:cNvPr id="9220" name="Picture 4"/>
-          <p:cNvPicPr>
-            <a:picLocks noChangeAspect="1" noChangeArrowheads="1"/>
-          </p:cNvPicPr>
-          <p:nvPr/>
-        </p:nvPicPr>
-        <p:blipFill>
-          <a:blip r:embed="rId4" cstate="print"/>
-          <a:srcRect/>
-          <a:stretch>
-            <a:fillRect/>
-          </a:stretch>
-        </p:blipFill>
-        <p:spPr bwMode="auto">
-          <a:xfrm>
-            <a:off x="103579" y="72008"/>
-            <a:ext cx="6988701" cy="2204864"/>
-          </a:xfrm>
-          <a:prstGeom prst="rect">
-            <a:avLst/>
-          </a:prstGeom>
-          <a:noFill/>
-          <a:ln w="9525">
-            <a:noFill/>
-            <a:miter lim="800000"/>
-            <a:headEnd/>
-            <a:tailEnd/>
-          </a:ln>
-        </p:spPr>
-      </p:pic>
       <p:sp>
         <p:nvSpPr>
           <p:cNvPr id="11" name="2 Metin Yer Tutucusu"/>
@@ -4761,6 +4733,38 @@
           </a:p>
         </p:txBody>
       </p:sp>
+      <p:pic>
+        <p:nvPicPr>
+          <p:cNvPr id="15362" name="Picture 2"/>
+          <p:cNvPicPr>
+            <a:picLocks noChangeAspect="1" noChangeArrowheads="1"/>
+          </p:cNvPicPr>
+          <p:nvPr/>
+        </p:nvPicPr>
+        <p:blipFill>
+          <a:blip r:embed="rId4" cstate="print"/>
+          <a:srcRect/>
+          <a:stretch>
+            <a:fillRect/>
+          </a:stretch>
+        </p:blipFill>
+        <p:spPr bwMode="auto">
+          <a:xfrm>
+            <a:off x="107504" y="0"/>
+            <a:ext cx="6984776" cy="2379753"/>
+          </a:xfrm>
+          <a:prstGeom prst="rect">
+            <a:avLst/>
+          </a:prstGeom>
+          <a:noFill/>
+          <a:ln w="9525">
+            <a:noFill/>
+            <a:miter lim="800000"/>
+            <a:headEnd/>
+            <a:tailEnd/>
+          </a:ln>
+        </p:spPr>
+      </p:pic>
     </p:spTree>
   </p:cSld>
   <p:clrMapOvr>
@@ -4883,48 +4887,52 @@
           <a:bodyPr/>
           <a:lstStyle/>
           <a:p>
-            <a:endParaRPr lang="tr-TR"/>
-          </a:p>
-        </p:txBody>
-      </p:sp>
-      <p:sp>
-        <p:nvSpPr>
-          <p:cNvPr id="3" name="2 İçerik Yer Tutucusu"/>
-          <p:cNvSpPr>
-            <a:spLocks noGrp="1"/>
-          </p:cNvSpPr>
-          <p:nvPr>
-            <p:ph sz="half" idx="1"/>
-          </p:nvPr>
-        </p:nvSpPr>
-        <p:spPr/>
-        <p:txBody>
-          <a:bodyPr/>
-          <a:lstStyle/>
-          <a:p>
-            <a:endParaRPr lang="tr-TR"/>
-          </a:p>
-        </p:txBody>
-      </p:sp>
-      <p:sp>
-        <p:nvSpPr>
-          <p:cNvPr id="4" name="3 İçerik Yer Tutucusu"/>
-          <p:cNvSpPr>
-            <a:spLocks noGrp="1"/>
-          </p:cNvSpPr>
-          <p:nvPr>
-            <p:ph sz="half" idx="2"/>
-          </p:nvPr>
-        </p:nvSpPr>
-        <p:spPr/>
-        <p:txBody>
-          <a:bodyPr/>
-          <a:lstStyle/>
-          <a:p>
-            <a:endParaRPr lang="tr-TR"/>
-          </a:p>
-        </p:txBody>
-      </p:sp>
+            <a:r>
+              <a:rPr lang="tr-TR" dirty="0" smtClean="0"/>
+              <a:t>800rpm no </a:t>
+            </a:r>
+            <a:r>
+              <a:rPr lang="tr-TR" dirty="0" err="1" smtClean="0"/>
+              <a:t>load</a:t>
+            </a:r>
+            <a:endParaRPr lang="tr-TR" dirty="0"/>
+          </a:p>
+        </p:txBody>
+      </p:sp>
+      <p:pic>
+        <p:nvPicPr>
+          <p:cNvPr id="2050" name="Picture 2"/>
+          <p:cNvPicPr>
+            <a:picLocks noGrp="1" noChangeAspect="1" noChangeArrowheads="1"/>
+          </p:cNvPicPr>
+          <p:nvPr>
+            <p:ph idx="1"/>
+          </p:nvPr>
+        </p:nvPicPr>
+        <p:blipFill>
+          <a:blip r:embed="rId2" cstate="print"/>
+          <a:srcRect/>
+          <a:stretch>
+            <a:fillRect/>
+          </a:stretch>
+        </p:blipFill>
+        <p:spPr bwMode="auto">
+          <a:xfrm>
+            <a:off x="457200" y="1811104"/>
+            <a:ext cx="8229600" cy="4104154"/>
+          </a:xfrm>
+          <a:prstGeom prst="rect">
+            <a:avLst/>
+          </a:prstGeom>
+          <a:noFill/>
+          <a:ln w="9525">
+            <a:noFill/>
+            <a:miter lim="800000"/>
+            <a:headEnd/>
+            <a:tailEnd/>
+          </a:ln>
+        </p:spPr>
+      </p:pic>
     </p:spTree>
   </p:cSld>
   <p:clrMapOvr>
@@ -4965,48 +4973,600 @@
           <a:bodyPr/>
           <a:lstStyle/>
           <a:p>
-            <a:endParaRPr lang="tr-TR"/>
-          </a:p>
-        </p:txBody>
-      </p:sp>
-      <p:sp>
-        <p:nvSpPr>
-          <p:cNvPr id="3" name="2 İçerik Yer Tutucusu"/>
-          <p:cNvSpPr>
-            <a:spLocks noGrp="1"/>
-          </p:cNvSpPr>
-          <p:nvPr>
-            <p:ph sz="half" idx="1"/>
-          </p:nvPr>
-        </p:nvSpPr>
-        <p:spPr/>
-        <p:txBody>
-          <a:bodyPr/>
-          <a:lstStyle/>
-          <a:p>
-            <a:endParaRPr lang="tr-TR"/>
-          </a:p>
-        </p:txBody>
-      </p:sp>
-      <p:sp>
-        <p:nvSpPr>
-          <p:cNvPr id="4" name="3 İçerik Yer Tutucusu"/>
-          <p:cNvSpPr>
-            <a:spLocks noGrp="1"/>
-          </p:cNvSpPr>
-          <p:nvPr>
-            <p:ph sz="half" idx="2"/>
-          </p:nvPr>
-        </p:nvSpPr>
-        <p:spPr/>
-        <p:txBody>
-          <a:bodyPr/>
-          <a:lstStyle/>
-          <a:p>
-            <a:endParaRPr lang="tr-TR"/>
-          </a:p>
-        </p:txBody>
-      </p:sp>
+            <a:r>
+              <a:rPr lang="tr-TR" dirty="0" smtClean="0"/>
+              <a:t>800rpm </a:t>
+            </a:r>
+            <a:r>
+              <a:rPr lang="tr-TR" dirty="0" err="1" smtClean="0"/>
+              <a:t>noload</a:t>
+            </a:r>
+            <a:r>
+              <a:rPr lang="tr-TR" dirty="0" smtClean="0"/>
+              <a:t> 53.3Hz </a:t>
+            </a:r>
+            <a:r>
+              <a:rPr lang="tr-TR" dirty="0" err="1" smtClean="0"/>
+              <a:t>fund</a:t>
+            </a:r>
+            <a:r>
+              <a:rPr lang="tr-TR" dirty="0" smtClean="0"/>
+              <a:t>.</a:t>
+            </a:r>
+            <a:endParaRPr lang="tr-TR" dirty="0"/>
+          </a:p>
+        </p:txBody>
+      </p:sp>
+      <p:pic>
+        <p:nvPicPr>
+          <p:cNvPr id="3074" name="Picture 2"/>
+          <p:cNvPicPr>
+            <a:picLocks noGrp="1" noChangeAspect="1" noChangeArrowheads="1"/>
+          </p:cNvPicPr>
+          <p:nvPr>
+            <p:ph idx="1"/>
+          </p:nvPr>
+        </p:nvPicPr>
+        <p:blipFill>
+          <a:blip r:embed="rId2" cstate="print"/>
+          <a:srcRect/>
+          <a:stretch>
+            <a:fillRect/>
+          </a:stretch>
+        </p:blipFill>
+        <p:spPr bwMode="auto">
+          <a:xfrm>
+            <a:off x="457200" y="1892714"/>
+            <a:ext cx="8229600" cy="3940935"/>
+          </a:xfrm>
+          <a:prstGeom prst="rect">
+            <a:avLst/>
+          </a:prstGeom>
+          <a:noFill/>
+          <a:ln w="9525">
+            <a:noFill/>
+            <a:miter lim="800000"/>
+            <a:headEnd/>
+            <a:tailEnd/>
+          </a:ln>
+        </p:spPr>
+      </p:pic>
+    </p:spTree>
+  </p:cSld>
+  <p:clrMapOvr>
+    <a:masterClrMapping/>
+  </p:clrMapOvr>
+</p:sld>
+</file>
+
+<file path=ppt/slides/slide24.xml><?xml version="1.0" encoding="utf-8"?>
+<p:sld xmlns:a="http://schemas.openxmlformats.org/drawingml/2006/main" xmlns:r="http://schemas.openxmlformats.org/officeDocument/2006/relationships" xmlns:p="http://schemas.openxmlformats.org/presentationml/2006/main">
+  <p:cSld>
+    <p:spTree>
+      <p:nvGrpSpPr>
+        <p:cNvPr id="1" name=""/>
+        <p:cNvGrpSpPr/>
+        <p:nvPr/>
+      </p:nvGrpSpPr>
+      <p:grpSpPr>
+        <a:xfrm>
+          <a:off x="0" y="0"/>
+          <a:ext cx="0" cy="0"/>
+          <a:chOff x="0" y="0"/>
+          <a:chExt cx="0" cy="0"/>
+        </a:xfrm>
+      </p:grpSpPr>
+      <p:sp>
+        <p:nvSpPr>
+          <p:cNvPr id="2" name="1 Başlık"/>
+          <p:cNvSpPr>
+            <a:spLocks noGrp="1"/>
+          </p:cNvSpPr>
+          <p:nvPr>
+            <p:ph type="title"/>
+          </p:nvPr>
+        </p:nvSpPr>
+        <p:spPr/>
+        <p:txBody>
+          <a:bodyPr/>
+          <a:lstStyle/>
+          <a:p>
+            <a:r>
+              <a:rPr lang="tr-TR" dirty="0" smtClean="0"/>
+              <a:t>800rpm + 2Nm </a:t>
+            </a:r>
+            <a:r>
+              <a:rPr lang="tr-TR" dirty="0" err="1" smtClean="0"/>
+              <a:t>pulse</a:t>
+            </a:r>
+            <a:endParaRPr lang="tr-TR" dirty="0"/>
+          </a:p>
+        </p:txBody>
+      </p:sp>
+      <p:pic>
+        <p:nvPicPr>
+          <p:cNvPr id="4098" name="Picture 2"/>
+          <p:cNvPicPr>
+            <a:picLocks noGrp="1" noChangeAspect="1" noChangeArrowheads="1"/>
+          </p:cNvPicPr>
+          <p:nvPr>
+            <p:ph idx="1"/>
+          </p:nvPr>
+        </p:nvPicPr>
+        <p:blipFill>
+          <a:blip r:embed="rId2" cstate="print"/>
+          <a:srcRect/>
+          <a:stretch>
+            <a:fillRect/>
+          </a:stretch>
+        </p:blipFill>
+        <p:spPr bwMode="auto">
+          <a:xfrm>
+            <a:off x="457200" y="1787222"/>
+            <a:ext cx="8229600" cy="4151918"/>
+          </a:xfrm>
+          <a:prstGeom prst="rect">
+            <a:avLst/>
+          </a:prstGeom>
+          <a:noFill/>
+          <a:ln w="9525">
+            <a:noFill/>
+            <a:miter lim="800000"/>
+            <a:headEnd/>
+            <a:tailEnd/>
+          </a:ln>
+        </p:spPr>
+      </p:pic>
+    </p:spTree>
+  </p:cSld>
+  <p:clrMapOvr>
+    <a:masterClrMapping/>
+  </p:clrMapOvr>
+</p:sld>
+</file>
+
+<file path=ppt/slides/slide25.xml><?xml version="1.0" encoding="utf-8"?>
+<p:sld xmlns:a="http://schemas.openxmlformats.org/drawingml/2006/main" xmlns:r="http://schemas.openxmlformats.org/officeDocument/2006/relationships" xmlns:p="http://schemas.openxmlformats.org/presentationml/2006/main">
+  <p:cSld>
+    <p:spTree>
+      <p:nvGrpSpPr>
+        <p:cNvPr id="1" name=""/>
+        <p:cNvGrpSpPr/>
+        <p:nvPr/>
+      </p:nvGrpSpPr>
+      <p:grpSpPr>
+        <a:xfrm>
+          <a:off x="0" y="0"/>
+          <a:ext cx="0" cy="0"/>
+          <a:chOff x="0" y="0"/>
+          <a:chExt cx="0" cy="0"/>
+        </a:xfrm>
+      </p:grpSpPr>
+      <p:sp>
+        <p:nvSpPr>
+          <p:cNvPr id="2" name="1 Başlık"/>
+          <p:cNvSpPr>
+            <a:spLocks noGrp="1"/>
+          </p:cNvSpPr>
+          <p:nvPr>
+            <p:ph type="title"/>
+          </p:nvPr>
+        </p:nvSpPr>
+        <p:spPr/>
+        <p:txBody>
+          <a:bodyPr/>
+          <a:lstStyle/>
+          <a:p>
+            <a:r>
+              <a:rPr lang="tr-TR" dirty="0" smtClean="0"/>
+              <a:t>800rpm + 2Nm </a:t>
+            </a:r>
+            <a:r>
+              <a:rPr lang="tr-TR" dirty="0" err="1" smtClean="0"/>
+              <a:t>pulse</a:t>
+            </a:r>
+            <a:r>
+              <a:rPr lang="tr-TR" dirty="0" smtClean="0"/>
+              <a:t> 53.3Hz</a:t>
+            </a:r>
+            <a:endParaRPr lang="tr-TR" dirty="0"/>
+          </a:p>
+        </p:txBody>
+      </p:sp>
+      <p:pic>
+        <p:nvPicPr>
+          <p:cNvPr id="5125" name="Picture 5"/>
+          <p:cNvPicPr>
+            <a:picLocks noGrp="1" noChangeAspect="1" noChangeArrowheads="1"/>
+          </p:cNvPicPr>
+          <p:nvPr>
+            <p:ph idx="1"/>
+          </p:nvPr>
+        </p:nvPicPr>
+        <p:blipFill>
+          <a:blip r:embed="rId2" cstate="print"/>
+          <a:srcRect/>
+          <a:stretch>
+            <a:fillRect/>
+          </a:stretch>
+        </p:blipFill>
+        <p:spPr bwMode="auto">
+          <a:xfrm>
+            <a:off x="457200" y="1884137"/>
+            <a:ext cx="8229600" cy="3958088"/>
+          </a:xfrm>
+          <a:prstGeom prst="rect">
+            <a:avLst/>
+          </a:prstGeom>
+          <a:noFill/>
+          <a:ln w="9525">
+            <a:noFill/>
+            <a:miter lim="800000"/>
+            <a:headEnd/>
+            <a:tailEnd/>
+          </a:ln>
+        </p:spPr>
+      </p:pic>
+    </p:spTree>
+  </p:cSld>
+  <p:clrMapOvr>
+    <a:masterClrMapping/>
+  </p:clrMapOvr>
+</p:sld>
+</file>
+
+<file path=ppt/slides/slide26.xml><?xml version="1.0" encoding="utf-8"?>
+<p:sld xmlns:a="http://schemas.openxmlformats.org/drawingml/2006/main" xmlns:r="http://schemas.openxmlformats.org/officeDocument/2006/relationships" xmlns:p="http://schemas.openxmlformats.org/presentationml/2006/main">
+  <p:cSld>
+    <p:spTree>
+      <p:nvGrpSpPr>
+        <p:cNvPr id="1" name=""/>
+        <p:cNvGrpSpPr/>
+        <p:nvPr/>
+      </p:nvGrpSpPr>
+      <p:grpSpPr>
+        <a:xfrm>
+          <a:off x="0" y="0"/>
+          <a:ext cx="0" cy="0"/>
+          <a:chOff x="0" y="0"/>
+          <a:chExt cx="0" cy="0"/>
+        </a:xfrm>
+      </p:grpSpPr>
+      <p:sp>
+        <p:nvSpPr>
+          <p:cNvPr id="2" name="1 Başlık"/>
+          <p:cNvSpPr>
+            <a:spLocks noGrp="1"/>
+          </p:cNvSpPr>
+          <p:nvPr>
+            <p:ph type="title"/>
+          </p:nvPr>
+        </p:nvSpPr>
+        <p:spPr/>
+        <p:txBody>
+          <a:bodyPr/>
+          <a:lstStyle/>
+          <a:p>
+            <a:r>
+              <a:rPr lang="tr-TR" dirty="0" smtClean="0"/>
+              <a:t>400rpm </a:t>
+            </a:r>
+            <a:r>
+              <a:rPr lang="tr-TR" dirty="0" err="1" smtClean="0"/>
+              <a:t>noload</a:t>
+            </a:r>
+            <a:endParaRPr lang="tr-TR" dirty="0"/>
+          </a:p>
+        </p:txBody>
+      </p:sp>
+      <p:pic>
+        <p:nvPicPr>
+          <p:cNvPr id="6146" name="Picture 2"/>
+          <p:cNvPicPr>
+            <a:picLocks noGrp="1" noChangeAspect="1" noChangeArrowheads="1"/>
+          </p:cNvPicPr>
+          <p:nvPr>
+            <p:ph idx="1"/>
+          </p:nvPr>
+        </p:nvPicPr>
+        <p:blipFill>
+          <a:blip r:embed="rId2" cstate="print"/>
+          <a:srcRect/>
+          <a:stretch>
+            <a:fillRect/>
+          </a:stretch>
+        </p:blipFill>
+        <p:spPr bwMode="auto">
+          <a:xfrm>
+            <a:off x="457200" y="1704233"/>
+            <a:ext cx="8229600" cy="4317897"/>
+          </a:xfrm>
+          <a:prstGeom prst="rect">
+            <a:avLst/>
+          </a:prstGeom>
+          <a:noFill/>
+          <a:ln w="9525">
+            <a:noFill/>
+            <a:miter lim="800000"/>
+            <a:headEnd/>
+            <a:tailEnd/>
+          </a:ln>
+        </p:spPr>
+      </p:pic>
+    </p:spTree>
+  </p:cSld>
+  <p:clrMapOvr>
+    <a:masterClrMapping/>
+  </p:clrMapOvr>
+</p:sld>
+</file>
+
+<file path=ppt/slides/slide27.xml><?xml version="1.0" encoding="utf-8"?>
+<p:sld xmlns:a="http://schemas.openxmlformats.org/drawingml/2006/main" xmlns:r="http://schemas.openxmlformats.org/officeDocument/2006/relationships" xmlns:p="http://schemas.openxmlformats.org/presentationml/2006/main">
+  <p:cSld>
+    <p:spTree>
+      <p:nvGrpSpPr>
+        <p:cNvPr id="1" name=""/>
+        <p:cNvGrpSpPr/>
+        <p:nvPr/>
+      </p:nvGrpSpPr>
+      <p:grpSpPr>
+        <a:xfrm>
+          <a:off x="0" y="0"/>
+          <a:ext cx="0" cy="0"/>
+          <a:chOff x="0" y="0"/>
+          <a:chExt cx="0" cy="0"/>
+        </a:xfrm>
+      </p:grpSpPr>
+      <p:sp>
+        <p:nvSpPr>
+          <p:cNvPr id="2" name="1 Başlık"/>
+          <p:cNvSpPr>
+            <a:spLocks noGrp="1"/>
+          </p:cNvSpPr>
+          <p:nvPr>
+            <p:ph type="title"/>
+          </p:nvPr>
+        </p:nvSpPr>
+        <p:spPr/>
+        <p:txBody>
+          <a:bodyPr/>
+          <a:lstStyle/>
+          <a:p>
+            <a:r>
+              <a:rPr lang="tr-TR" dirty="0" smtClean="0"/>
+              <a:t>400rpm 26.6Hz </a:t>
+            </a:r>
+            <a:r>
+              <a:rPr lang="tr-TR" dirty="0" err="1" smtClean="0"/>
+              <a:t>fund</a:t>
+            </a:r>
+            <a:endParaRPr lang="tr-TR" dirty="0"/>
+          </a:p>
+        </p:txBody>
+      </p:sp>
+      <p:pic>
+        <p:nvPicPr>
+          <p:cNvPr id="7170" name="Picture 2"/>
+          <p:cNvPicPr>
+            <a:picLocks noGrp="1" noChangeAspect="1" noChangeArrowheads="1"/>
+          </p:cNvPicPr>
+          <p:nvPr>
+            <p:ph idx="1"/>
+          </p:nvPr>
+        </p:nvPicPr>
+        <p:blipFill>
+          <a:blip r:embed="rId2" cstate="print"/>
+          <a:srcRect/>
+          <a:stretch>
+            <a:fillRect/>
+          </a:stretch>
+        </p:blipFill>
+        <p:spPr bwMode="auto">
+          <a:xfrm>
+            <a:off x="457200" y="1885940"/>
+            <a:ext cx="8229600" cy="3954483"/>
+          </a:xfrm>
+          <a:prstGeom prst="rect">
+            <a:avLst/>
+          </a:prstGeom>
+          <a:noFill/>
+          <a:ln w="9525">
+            <a:noFill/>
+            <a:miter lim="800000"/>
+            <a:headEnd/>
+            <a:tailEnd/>
+          </a:ln>
+        </p:spPr>
+      </p:pic>
+    </p:spTree>
+  </p:cSld>
+  <p:clrMapOvr>
+    <a:masterClrMapping/>
+  </p:clrMapOvr>
+</p:sld>
+</file>
+
+<file path=ppt/slides/slide28.xml><?xml version="1.0" encoding="utf-8"?>
+<p:sld xmlns:a="http://schemas.openxmlformats.org/drawingml/2006/main" xmlns:r="http://schemas.openxmlformats.org/officeDocument/2006/relationships" xmlns:p="http://schemas.openxmlformats.org/presentationml/2006/main">
+  <p:cSld>
+    <p:spTree>
+      <p:nvGrpSpPr>
+        <p:cNvPr id="1" name=""/>
+        <p:cNvGrpSpPr/>
+        <p:nvPr/>
+      </p:nvGrpSpPr>
+      <p:grpSpPr>
+        <a:xfrm>
+          <a:off x="0" y="0"/>
+          <a:ext cx="0" cy="0"/>
+          <a:chOff x="0" y="0"/>
+          <a:chExt cx="0" cy="0"/>
+        </a:xfrm>
+      </p:grpSpPr>
+      <p:sp>
+        <p:nvSpPr>
+          <p:cNvPr id="2" name="1 Başlık"/>
+          <p:cNvSpPr>
+            <a:spLocks noGrp="1"/>
+          </p:cNvSpPr>
+          <p:nvPr>
+            <p:ph type="title"/>
+          </p:nvPr>
+        </p:nvSpPr>
+        <p:spPr/>
+        <p:txBody>
+          <a:bodyPr/>
+          <a:lstStyle/>
+          <a:p>
+            <a:r>
+              <a:rPr lang="tr-TR" dirty="0" smtClean="0"/>
+              <a:t>400rpm 29-30-33-34Nm </a:t>
+            </a:r>
+            <a:r>
+              <a:rPr lang="tr-TR" dirty="0" err="1" smtClean="0"/>
+              <a:t>loading</a:t>
+            </a:r>
+            <a:endParaRPr lang="tr-TR" dirty="0"/>
+          </a:p>
+        </p:txBody>
+      </p:sp>
+      <p:pic>
+        <p:nvPicPr>
+          <p:cNvPr id="9218" name="Picture 2"/>
+          <p:cNvPicPr>
+            <a:picLocks noGrp="1" noChangeAspect="1" noChangeArrowheads="1"/>
+          </p:cNvPicPr>
+          <p:nvPr>
+            <p:ph idx="1"/>
+          </p:nvPr>
+        </p:nvPicPr>
+        <p:blipFill>
+          <a:blip r:embed="rId2" cstate="print"/>
+          <a:srcRect/>
+          <a:stretch>
+            <a:fillRect/>
+          </a:stretch>
+        </p:blipFill>
+        <p:spPr bwMode="auto">
+          <a:xfrm>
+            <a:off x="457200" y="1705284"/>
+            <a:ext cx="8229600" cy="4315794"/>
+          </a:xfrm>
+          <a:prstGeom prst="rect">
+            <a:avLst/>
+          </a:prstGeom>
+          <a:noFill/>
+          <a:ln w="9525">
+            <a:noFill/>
+            <a:miter lim="800000"/>
+            <a:headEnd/>
+            <a:tailEnd/>
+          </a:ln>
+        </p:spPr>
+      </p:pic>
+    </p:spTree>
+  </p:cSld>
+  <p:clrMapOvr>
+    <a:masterClrMapping/>
+  </p:clrMapOvr>
+</p:sld>
+</file>
+
+<file path=ppt/slides/slide29.xml><?xml version="1.0" encoding="utf-8"?>
+<p:sld xmlns:a="http://schemas.openxmlformats.org/drawingml/2006/main" xmlns:r="http://schemas.openxmlformats.org/officeDocument/2006/relationships" xmlns:p="http://schemas.openxmlformats.org/presentationml/2006/main">
+  <p:cSld>
+    <p:spTree>
+      <p:nvGrpSpPr>
+        <p:cNvPr id="1" name=""/>
+        <p:cNvGrpSpPr/>
+        <p:nvPr/>
+      </p:nvGrpSpPr>
+      <p:grpSpPr>
+        <a:xfrm>
+          <a:off x="0" y="0"/>
+          <a:ext cx="0" cy="0"/>
+          <a:chOff x="0" y="0"/>
+          <a:chExt cx="0" cy="0"/>
+        </a:xfrm>
+      </p:grpSpPr>
+      <p:sp>
+        <p:nvSpPr>
+          <p:cNvPr id="2" name="1 Başlık"/>
+          <p:cNvSpPr>
+            <a:spLocks noGrp="1"/>
+          </p:cNvSpPr>
+          <p:nvPr>
+            <p:ph type="title"/>
+          </p:nvPr>
+        </p:nvSpPr>
+        <p:spPr/>
+        <p:txBody>
+          <a:bodyPr/>
+          <a:lstStyle/>
+          <a:p>
+            <a:r>
+              <a:rPr lang="tr-TR" dirty="0" smtClean="0"/>
+              <a:t>400 </a:t>
+            </a:r>
+            <a:r>
+              <a:rPr lang="tr-TR" dirty="0" err="1" smtClean="0"/>
+              <a:t>rpm</a:t>
+            </a:r>
+            <a:r>
+              <a:rPr lang="tr-TR" dirty="0" smtClean="0"/>
+              <a:t> 29-30-33-34 </a:t>
+            </a:r>
+            <a:r>
+              <a:rPr lang="tr-TR" dirty="0" err="1" smtClean="0"/>
+              <a:t>Nm</a:t>
+            </a:r>
+            <a:r>
+              <a:rPr lang="tr-TR" dirty="0" smtClean="0"/>
+              <a:t> </a:t>
+            </a:r>
+            <a:r>
+              <a:rPr lang="tr-TR" dirty="0" err="1" smtClean="0"/>
+              <a:t>loading</a:t>
+            </a:r>
+            <a:endParaRPr lang="tr-TR" dirty="0"/>
+          </a:p>
+        </p:txBody>
+      </p:sp>
+      <p:pic>
+        <p:nvPicPr>
+          <p:cNvPr id="10242" name="Picture 2"/>
+          <p:cNvPicPr>
+            <a:picLocks noGrp="1" noChangeAspect="1" noChangeArrowheads="1"/>
+          </p:cNvPicPr>
+          <p:nvPr>
+            <p:ph idx="1"/>
+          </p:nvPr>
+        </p:nvPicPr>
+        <p:blipFill>
+          <a:blip r:embed="rId2" cstate="print"/>
+          <a:srcRect/>
+          <a:stretch>
+            <a:fillRect/>
+          </a:stretch>
+        </p:blipFill>
+        <p:spPr bwMode="auto">
+          <a:xfrm>
+            <a:off x="457200" y="1870564"/>
+            <a:ext cx="8229600" cy="3985235"/>
+          </a:xfrm>
+          <a:prstGeom prst="rect">
+            <a:avLst/>
+          </a:prstGeom>
+          <a:noFill/>
+          <a:ln w="9525">
+            <a:noFill/>
+            <a:miter lim="800000"/>
+            <a:headEnd/>
+            <a:tailEnd/>
+          </a:ln>
+        </p:spPr>
+      </p:pic>
     </p:spTree>
   </p:cSld>
   <p:clrMapOvr>
@@ -5081,6 +5641,178 @@
           <a:xfrm>
             <a:off x="457200" y="908720"/>
             <a:ext cx="8229600" cy="5760640"/>
+          </a:xfrm>
+          <a:prstGeom prst="rect">
+            <a:avLst/>
+          </a:prstGeom>
+          <a:noFill/>
+          <a:ln w="9525">
+            <a:noFill/>
+            <a:miter lim="800000"/>
+            <a:headEnd/>
+            <a:tailEnd/>
+          </a:ln>
+        </p:spPr>
+      </p:pic>
+    </p:spTree>
+  </p:cSld>
+  <p:clrMapOvr>
+    <a:masterClrMapping/>
+  </p:clrMapOvr>
+</p:sld>
+</file>
+
+<file path=ppt/slides/slide30.xml><?xml version="1.0" encoding="utf-8"?>
+<p:sld xmlns:a="http://schemas.openxmlformats.org/drawingml/2006/main" xmlns:r="http://schemas.openxmlformats.org/officeDocument/2006/relationships" xmlns:p="http://schemas.openxmlformats.org/presentationml/2006/main">
+  <p:cSld>
+    <p:spTree>
+      <p:nvGrpSpPr>
+        <p:cNvPr id="1" name=""/>
+        <p:cNvGrpSpPr/>
+        <p:nvPr/>
+      </p:nvGrpSpPr>
+      <p:grpSpPr>
+        <a:xfrm>
+          <a:off x="0" y="0"/>
+          <a:ext cx="0" cy="0"/>
+          <a:chOff x="0" y="0"/>
+          <a:chExt cx="0" cy="0"/>
+        </a:xfrm>
+      </p:grpSpPr>
+      <p:sp>
+        <p:nvSpPr>
+          <p:cNvPr id="2" name="1 Başlık"/>
+          <p:cNvSpPr>
+            <a:spLocks noGrp="1"/>
+          </p:cNvSpPr>
+          <p:nvPr>
+            <p:ph type="title"/>
+          </p:nvPr>
+        </p:nvSpPr>
+        <p:spPr/>
+        <p:txBody>
+          <a:bodyPr/>
+          <a:lstStyle/>
+          <a:p>
+            <a:r>
+              <a:rPr lang="tr-TR" dirty="0" smtClean="0"/>
+              <a:t>400rpm 60Nm </a:t>
+            </a:r>
+            <a:r>
+              <a:rPr lang="tr-TR" dirty="0" err="1" smtClean="0"/>
+              <a:t>loading</a:t>
+            </a:r>
+            <a:endParaRPr lang="tr-TR" dirty="0"/>
+          </a:p>
+        </p:txBody>
+      </p:sp>
+      <p:pic>
+        <p:nvPicPr>
+          <p:cNvPr id="8194" name="Picture 2"/>
+          <p:cNvPicPr>
+            <a:picLocks noGrp="1" noChangeAspect="1" noChangeArrowheads="1"/>
+          </p:cNvPicPr>
+          <p:nvPr>
+            <p:ph idx="1"/>
+          </p:nvPr>
+        </p:nvPicPr>
+        <p:blipFill>
+          <a:blip r:embed="rId2" cstate="print"/>
+          <a:srcRect/>
+          <a:stretch>
+            <a:fillRect/>
+          </a:stretch>
+        </p:blipFill>
+        <p:spPr bwMode="auto">
+          <a:xfrm>
+            <a:off x="457200" y="1699701"/>
+            <a:ext cx="8229600" cy="4326961"/>
+          </a:xfrm>
+          <a:prstGeom prst="rect">
+            <a:avLst/>
+          </a:prstGeom>
+          <a:noFill/>
+          <a:ln w="9525">
+            <a:noFill/>
+            <a:miter lim="800000"/>
+            <a:headEnd/>
+            <a:tailEnd/>
+          </a:ln>
+        </p:spPr>
+      </p:pic>
+    </p:spTree>
+  </p:cSld>
+  <p:clrMapOvr>
+    <a:masterClrMapping/>
+  </p:clrMapOvr>
+</p:sld>
+</file>
+
+<file path=ppt/slides/slide31.xml><?xml version="1.0" encoding="utf-8"?>
+<p:sld xmlns:a="http://schemas.openxmlformats.org/drawingml/2006/main" xmlns:r="http://schemas.openxmlformats.org/officeDocument/2006/relationships" xmlns:p="http://schemas.openxmlformats.org/presentationml/2006/main">
+  <p:cSld>
+    <p:spTree>
+      <p:nvGrpSpPr>
+        <p:cNvPr id="1" name=""/>
+        <p:cNvGrpSpPr/>
+        <p:nvPr/>
+      </p:nvGrpSpPr>
+      <p:grpSpPr>
+        <a:xfrm>
+          <a:off x="0" y="0"/>
+          <a:ext cx="0" cy="0"/>
+          <a:chOff x="0" y="0"/>
+          <a:chExt cx="0" cy="0"/>
+        </a:xfrm>
+      </p:grpSpPr>
+      <p:sp>
+        <p:nvSpPr>
+          <p:cNvPr id="2" name="1 Başlık"/>
+          <p:cNvSpPr>
+            <a:spLocks noGrp="1"/>
+          </p:cNvSpPr>
+          <p:nvPr>
+            <p:ph type="title"/>
+          </p:nvPr>
+        </p:nvSpPr>
+        <p:spPr/>
+        <p:txBody>
+          <a:bodyPr/>
+          <a:lstStyle/>
+          <a:p>
+            <a:r>
+              <a:rPr lang="tr-TR" dirty="0" smtClean="0"/>
+              <a:t>400rpm 60Nm </a:t>
+            </a:r>
+            <a:r>
+              <a:rPr lang="tr-TR" dirty="0" err="1" smtClean="0"/>
+              <a:t>loading</a:t>
+            </a:r>
+            <a:endParaRPr lang="tr-TR" dirty="0"/>
+          </a:p>
+        </p:txBody>
+      </p:sp>
+      <p:pic>
+        <p:nvPicPr>
+          <p:cNvPr id="11267" name="Picture 3"/>
+          <p:cNvPicPr>
+            <a:picLocks noGrp="1" noChangeAspect="1" noChangeArrowheads="1"/>
+          </p:cNvPicPr>
+          <p:nvPr>
+            <p:ph idx="1"/>
+          </p:nvPr>
+        </p:nvPicPr>
+        <p:blipFill>
+          <a:blip r:embed="rId2" cstate="print"/>
+          <a:srcRect/>
+          <a:stretch>
+            <a:fillRect/>
+          </a:stretch>
+        </p:blipFill>
+        <p:spPr bwMode="auto">
+          <a:xfrm>
+            <a:off x="457200" y="1911742"/>
+            <a:ext cx="8229600" cy="3902879"/>
           </a:xfrm>
           <a:prstGeom prst="rect">
             <a:avLst/>
@@ -5368,7 +6100,11 @@
             </a:r>
             <a:r>
               <a:rPr lang="tr-TR" dirty="0" smtClean="0"/>
-              <a:t> 0-200Hz</a:t>
+              <a:t> </a:t>
+            </a:r>
+            <a:r>
+              <a:rPr lang="tr-TR" dirty="0" smtClean="0"/>
+              <a:t>0-500Hz</a:t>
             </a:r>
             <a:endParaRPr lang="tr-TR" dirty="0"/>
           </a:p>
@@ -5376,7 +6112,7 @@
       </p:sp>
       <p:pic>
         <p:nvPicPr>
-          <p:cNvPr id="14339" name="Picture 3"/>
+          <p:cNvPr id="12291" name="Picture 3"/>
           <p:cNvPicPr>
             <a:picLocks noGrp="1" noChangeAspect="1" noChangeArrowheads="1"/>
           </p:cNvPicPr>
@@ -5393,8 +6129,8 @@
         </p:blipFill>
         <p:spPr bwMode="auto">
           <a:xfrm>
-            <a:off x="462883" y="1851025"/>
-            <a:ext cx="8218233" cy="4024313"/>
+            <a:off x="457200" y="1630886"/>
+            <a:ext cx="8229600" cy="4464590"/>
           </a:xfrm>
           <a:prstGeom prst="rect">
             <a:avLst/>
@@ -5458,7 +6194,7 @@
             </a:r>
             <a:r>
               <a:rPr lang="tr-TR" dirty="0" err="1" smtClean="0"/>
-              <a:t>driver</a:t>
+              <a:t>Driver</a:t>
             </a:r>
             <a:r>
               <a:rPr lang="tr-TR" dirty="0" smtClean="0"/>
@@ -5467,18 +6203,6 @@
             <a:r>
               <a:rPr lang="tr-TR" dirty="0" err="1" smtClean="0"/>
               <a:t>noise</a:t>
-            </a:r>
-            <a:r>
-              <a:rPr lang="tr-TR" dirty="0" smtClean="0"/>
-              <a:t> </a:t>
-            </a:r>
-            <a:r>
-              <a:rPr lang="tr-TR" dirty="0" err="1" smtClean="0"/>
-              <a:t>zoom</a:t>
-            </a:r>
-            <a:r>
-              <a:rPr lang="tr-TR" dirty="0" smtClean="0"/>
-              <a:t> 36-52 Hz</a:t>
             </a:r>
             <a:endParaRPr lang="tr-TR" dirty="0"/>
           </a:p>
@@ -5503,8 +6227,8 @@
         </p:blipFill>
         <p:spPr bwMode="auto">
           <a:xfrm>
-            <a:off x="457200" y="1845668"/>
-            <a:ext cx="8229600" cy="4035026"/>
+            <a:off x="457200" y="1659937"/>
+            <a:ext cx="8229600" cy="4406489"/>
           </a:xfrm>
           <a:prstGeom prst="rect">
             <a:avLst/>
@@ -5584,7 +6308,7 @@
       </p:sp>
       <p:pic>
         <p:nvPicPr>
-          <p:cNvPr id="1028" name="Picture 4"/>
+          <p:cNvPr id="14338" name="Picture 2"/>
           <p:cNvPicPr>
             <a:picLocks noGrp="1" noChangeAspect="1" noChangeArrowheads="1"/>
           </p:cNvPicPr>
@@ -5601,8 +6325,8 @@
         </p:blipFill>
         <p:spPr bwMode="auto">
           <a:xfrm>
-            <a:off x="457200" y="1863682"/>
-            <a:ext cx="8229600" cy="3998999"/>
+            <a:off x="457200" y="1699701"/>
+            <a:ext cx="8229600" cy="4326961"/>
           </a:xfrm>
           <a:prstGeom prst="rect">
             <a:avLst/>
@@ -5653,20 +6377,18 @@
         </p:nvSpPr>
         <p:spPr/>
         <p:txBody>
-          <a:bodyPr/>
-          <a:lstStyle/>
-          <a:p>
+          <a:bodyPr>
+            <a:normAutofit fontScale="90000"/>
+          </a:bodyPr>
+          <a:lstStyle/>
+          <a:p>
+            <a:r>
+              <a:rPr lang="tr-TR" dirty="0" smtClean="0"/>
+              <a:t>600rpm no </a:t>
+            </a:r>
             <a:r>
               <a:rPr lang="tr-TR" dirty="0" err="1" smtClean="0"/>
-              <a:t>Grid</a:t>
-            </a:r>
-            <a:r>
-              <a:rPr lang="tr-TR" dirty="0" smtClean="0"/>
-              <a:t> + </a:t>
-            </a:r>
-            <a:r>
-              <a:rPr lang="tr-TR" dirty="0" err="1" smtClean="0"/>
-              <a:t>Driver</a:t>
+              <a:t>load</a:t>
             </a:r>
             <a:r>
               <a:rPr lang="tr-TR" dirty="0" smtClean="0"/>
@@ -5674,7 +6396,23 @@
             </a:r>
             <a:r>
               <a:rPr lang="tr-TR" dirty="0" err="1" smtClean="0"/>
-              <a:t>noise</a:t>
+              <a:t>with</a:t>
+            </a:r>
+            <a:r>
+              <a:rPr lang="tr-TR" dirty="0" smtClean="0"/>
+              <a:t> </a:t>
+            </a:r>
+            <a:r>
+              <a:rPr lang="tr-TR" dirty="0" err="1" smtClean="0"/>
+              <a:t>starting</a:t>
+            </a:r>
+            <a:r>
+              <a:rPr lang="tr-TR" dirty="0" smtClean="0"/>
+              <a:t> </a:t>
+            </a:r>
+            <a:r>
+              <a:rPr lang="tr-TR" dirty="0" err="1" smtClean="0"/>
+              <a:t>currents</a:t>
             </a:r>
             <a:endParaRPr lang="tr-TR" dirty="0"/>
           </a:p>
@@ -5682,12 +6420,12 @@
       </p:sp>
       <p:pic>
         <p:nvPicPr>
-          <p:cNvPr id="2050" name="Picture 2"/>
+          <p:cNvPr id="1026" name="Picture 2"/>
           <p:cNvPicPr>
             <a:picLocks noGrp="1" noChangeAspect="1" noChangeArrowheads="1"/>
           </p:cNvPicPr>
           <p:nvPr>
-            <p:ph idx="1"/>
+            <p:ph sz="half" idx="1"/>
           </p:nvPr>
         </p:nvPicPr>
         <p:blipFill>
@@ -5699,8 +6437,8 @@
         </p:blipFill>
         <p:spPr bwMode="auto">
           <a:xfrm>
-            <a:off x="457200" y="1861108"/>
-            <a:ext cx="8229600" cy="4004146"/>
+            <a:off x="107504" y="2060848"/>
+            <a:ext cx="8892379" cy="3114728"/>
           </a:xfrm>
           <a:prstGeom prst="rect">
             <a:avLst/>

</xml_diff>